<commit_message>
update on design part
</commit_message>
<xml_diff>
--- a/report/Milestone 2.pptx
+++ b/report/Milestone 2.pptx
@@ -9,9 +9,10 @@
     <p:sldId id="263" r:id="rId3"/>
     <p:sldId id="257" r:id="rId4"/>
     <p:sldId id="262" r:id="rId5"/>
-    <p:sldId id="258" r:id="rId6"/>
-    <p:sldId id="264" r:id="rId7"/>
-    <p:sldId id="261" r:id="rId8"/>
+    <p:sldId id="266" r:id="rId6"/>
+    <p:sldId id="258" r:id="rId7"/>
+    <p:sldId id="264" r:id="rId8"/>
+    <p:sldId id="261" r:id="rId9"/>
   </p:sldIdLst>
   <p:sldSz cx="9144000" cy="6858000" type="screen4x3"/>
   <p:notesSz cx="6858000" cy="9144000"/>
@@ -295,7 +296,7 @@
             <a:fld id="{530820CF-B880-4189-942D-D702A7CBA730}" type="datetimeFigureOut">
               <a:rPr lang="zh-CN" altLang="en-US" smtClean="0"/>
               <a:pPr/>
-              <a:t>2014/10/26</a:t>
+              <a:t>10/27/14</a:t>
             </a:fld>
             <a:endParaRPr lang="zh-CN" altLang="en-US"/>
           </a:p>
@@ -462,7 +463,7 @@
             <a:fld id="{530820CF-B880-4189-942D-D702A7CBA730}" type="datetimeFigureOut">
               <a:rPr lang="zh-CN" altLang="en-US" smtClean="0"/>
               <a:pPr/>
-              <a:t>2014/10/26</a:t>
+              <a:t>10/27/14</a:t>
             </a:fld>
             <a:endParaRPr lang="zh-CN" altLang="en-US"/>
           </a:p>
@@ -639,7 +640,7 @@
             <a:fld id="{530820CF-B880-4189-942D-D702A7CBA730}" type="datetimeFigureOut">
               <a:rPr lang="zh-CN" altLang="en-US" smtClean="0"/>
               <a:pPr/>
-              <a:t>2014/10/26</a:t>
+              <a:t>10/27/14</a:t>
             </a:fld>
             <a:endParaRPr lang="zh-CN" altLang="en-US"/>
           </a:p>
@@ -806,7 +807,7 @@
             <a:fld id="{530820CF-B880-4189-942D-D702A7CBA730}" type="datetimeFigureOut">
               <a:rPr lang="zh-CN" altLang="en-US" smtClean="0"/>
               <a:pPr/>
-              <a:t>2014/10/26</a:t>
+              <a:t>10/27/14</a:t>
             </a:fld>
             <a:endParaRPr lang="zh-CN" altLang="en-US"/>
           </a:p>
@@ -1049,7 +1050,7 @@
             <a:fld id="{530820CF-B880-4189-942D-D702A7CBA730}" type="datetimeFigureOut">
               <a:rPr lang="zh-CN" altLang="en-US" smtClean="0"/>
               <a:pPr/>
-              <a:t>2014/10/26</a:t>
+              <a:t>10/27/14</a:t>
             </a:fld>
             <a:endParaRPr lang="zh-CN" altLang="en-US"/>
           </a:p>
@@ -1334,7 +1335,7 @@
             <a:fld id="{530820CF-B880-4189-942D-D702A7CBA730}" type="datetimeFigureOut">
               <a:rPr lang="zh-CN" altLang="en-US" smtClean="0"/>
               <a:pPr/>
-              <a:t>2014/10/26</a:t>
+              <a:t>10/27/14</a:t>
             </a:fld>
             <a:endParaRPr lang="zh-CN" altLang="en-US"/>
           </a:p>
@@ -1753,7 +1754,7 @@
             <a:fld id="{530820CF-B880-4189-942D-D702A7CBA730}" type="datetimeFigureOut">
               <a:rPr lang="zh-CN" altLang="en-US" smtClean="0"/>
               <a:pPr/>
-              <a:t>2014/10/26</a:t>
+              <a:t>10/27/14</a:t>
             </a:fld>
             <a:endParaRPr lang="zh-CN" altLang="en-US"/>
           </a:p>
@@ -1868,7 +1869,7 @@
             <a:fld id="{530820CF-B880-4189-942D-D702A7CBA730}" type="datetimeFigureOut">
               <a:rPr lang="zh-CN" altLang="en-US" smtClean="0"/>
               <a:pPr/>
-              <a:t>2014/10/26</a:t>
+              <a:t>10/27/14</a:t>
             </a:fld>
             <a:endParaRPr lang="zh-CN" altLang="en-US"/>
           </a:p>
@@ -1960,7 +1961,7 @@
             <a:fld id="{530820CF-B880-4189-942D-D702A7CBA730}" type="datetimeFigureOut">
               <a:rPr lang="zh-CN" altLang="en-US" smtClean="0"/>
               <a:pPr/>
-              <a:t>2014/10/26</a:t>
+              <a:t>10/27/14</a:t>
             </a:fld>
             <a:endParaRPr lang="zh-CN" altLang="en-US"/>
           </a:p>
@@ -2234,7 +2235,7 @@
             <a:fld id="{530820CF-B880-4189-942D-D702A7CBA730}" type="datetimeFigureOut">
               <a:rPr lang="zh-CN" altLang="en-US" smtClean="0"/>
               <a:pPr/>
-              <a:t>2014/10/26</a:t>
+              <a:t>10/27/14</a:t>
             </a:fld>
             <a:endParaRPr lang="zh-CN" altLang="en-US"/>
           </a:p>
@@ -2484,7 +2485,7 @@
             <a:fld id="{530820CF-B880-4189-942D-D702A7CBA730}" type="datetimeFigureOut">
               <a:rPr lang="zh-CN" altLang="en-US" smtClean="0"/>
               <a:pPr/>
-              <a:t>2014/10/26</a:t>
+              <a:t>10/27/14</a:t>
             </a:fld>
             <a:endParaRPr lang="zh-CN" altLang="en-US"/>
           </a:p>
@@ -2703,7 +2704,7 @@
             <a:fld id="{530820CF-B880-4189-942D-D702A7CBA730}" type="datetimeFigureOut">
               <a:rPr lang="zh-CN" altLang="en-US" smtClean="0"/>
               <a:pPr/>
-              <a:t>2014/10/26</a:t>
+              <a:t>10/27/14</a:t>
             </a:fld>
             <a:endParaRPr lang="zh-CN" altLang="en-US"/>
           </a:p>
@@ -3104,17 +3105,7 @@
                 <a:latin typeface="Times New Roman" pitchFamily="18" charset="0"/>
                 <a:cs typeface="Times New Roman" pitchFamily="18" charset="0"/>
               </a:rPr>
-              <a:t>Visualizing and Clustering Climate </a:t>
-            </a:r>
-            <a:r>
-              <a:rPr lang="en-US" altLang="zh-CN" sz="5400" b="1" dirty="0" smtClean="0">
-                <a:solidFill>
-                  <a:schemeClr val="bg1"/>
-                </a:solidFill>
-                <a:latin typeface="Times New Roman" pitchFamily="18" charset="0"/>
-                <a:cs typeface="Times New Roman" pitchFamily="18" charset="0"/>
-              </a:rPr>
-              <a:t>Change</a:t>
+              <a:t>Visualizing and Clustering Climate Change</a:t>
             </a:r>
             <a:br>
               <a:rPr lang="en-US" altLang="zh-CN" sz="5400" b="1" dirty="0" smtClean="0">
@@ -3532,6 +3523,231 @@
           </a:p>
         </p:txBody>
       </p:sp>
+      <p:sp>
+        <p:nvSpPr>
+          <p:cNvPr id="4" name="Rectangle 3"/>
+          <p:cNvSpPr/>
+          <p:nvPr/>
+        </p:nvSpPr>
+        <p:spPr>
+          <a:xfrm>
+            <a:off x="395536" y="1124744"/>
+            <a:ext cx="7776864" cy="5386090"/>
+          </a:xfrm>
+          <a:prstGeom prst="rect">
+            <a:avLst/>
+          </a:prstGeom>
+        </p:spPr>
+        <p:txBody>
+          <a:bodyPr wrap="square">
+            <a:spAutoFit/>
+          </a:bodyPr>
+          <a:lstStyle/>
+          <a:p>
+            <a:pPr marL="457200" indent="-457200">
+              <a:buFont typeface="Arial"/>
+              <a:buChar char="•"/>
+            </a:pPr>
+            <a:r>
+              <a:rPr lang="en-US" sz="2800" dirty="0" smtClean="0">
+                <a:solidFill>
+                  <a:schemeClr val="bg1"/>
+                </a:solidFill>
+                <a:latin typeface="Times New Roman" pitchFamily="18" charset="0"/>
+                <a:cs typeface="Times New Roman" pitchFamily="18" charset="0"/>
+              </a:rPr>
+              <a:t>Features:</a:t>
+            </a:r>
+          </a:p>
+          <a:p>
+            <a:pPr marL="914400" lvl="1" indent="-457200">
+              <a:buFont typeface="Arial"/>
+              <a:buChar char="•"/>
+            </a:pPr>
+            <a:r>
+              <a:rPr lang="en-US" sz="2800" dirty="0" smtClean="0">
+                <a:solidFill>
+                  <a:schemeClr val="bg1"/>
+                </a:solidFill>
+                <a:latin typeface="Times New Roman" pitchFamily="18" charset="0"/>
+                <a:cs typeface="Times New Roman" pitchFamily="18" charset="0"/>
+              </a:rPr>
+              <a:t>~37,000 observation stations</a:t>
+            </a:r>
+          </a:p>
+          <a:p>
+            <a:pPr marL="914400" lvl="1" indent="-457200">
+              <a:buFont typeface="Arial"/>
+              <a:buChar char="•"/>
+            </a:pPr>
+            <a:r>
+              <a:rPr lang="en-US" sz="2800" dirty="0">
+                <a:solidFill>
+                  <a:schemeClr val="bg1"/>
+                </a:solidFill>
+                <a:latin typeface="Times New Roman" pitchFamily="18" charset="0"/>
+                <a:cs typeface="Times New Roman" pitchFamily="18" charset="0"/>
+              </a:rPr>
+              <a:t>5 key elements:</a:t>
+            </a:r>
+          </a:p>
+          <a:p>
+            <a:pPr marL="1371600" lvl="2" indent="-457200">
+              <a:buFont typeface="Arial"/>
+              <a:buChar char="•"/>
+            </a:pPr>
+            <a:r>
+              <a:rPr lang="en-US" sz="2000" dirty="0">
+                <a:solidFill>
+                  <a:schemeClr val="bg1"/>
+                </a:solidFill>
+                <a:latin typeface="Times New Roman" pitchFamily="18" charset="0"/>
+                <a:cs typeface="Times New Roman" pitchFamily="18" charset="0"/>
+              </a:rPr>
+              <a:t>Daily Maximum Temperature</a:t>
+            </a:r>
+          </a:p>
+          <a:p>
+            <a:pPr marL="1371600" lvl="2" indent="-457200">
+              <a:buFont typeface="Arial"/>
+              <a:buChar char="•"/>
+            </a:pPr>
+            <a:r>
+              <a:rPr lang="en-US" sz="2000" dirty="0">
+                <a:solidFill>
+                  <a:schemeClr val="bg1"/>
+                </a:solidFill>
+                <a:latin typeface="Times New Roman" pitchFamily="18" charset="0"/>
+                <a:cs typeface="Times New Roman" pitchFamily="18" charset="0"/>
+              </a:rPr>
+              <a:t>Daily Minimum Temperature </a:t>
+            </a:r>
+          </a:p>
+          <a:p>
+            <a:pPr marL="1371600" lvl="2" indent="-457200">
+              <a:buFont typeface="Arial"/>
+              <a:buChar char="•"/>
+            </a:pPr>
+            <a:r>
+              <a:rPr lang="en-US" sz="2000" dirty="0">
+                <a:solidFill>
+                  <a:schemeClr val="bg1"/>
+                </a:solidFill>
+                <a:latin typeface="Times New Roman" pitchFamily="18" charset="0"/>
+                <a:cs typeface="Times New Roman" pitchFamily="18" charset="0"/>
+              </a:rPr>
+              <a:t>Precipitation</a:t>
+            </a:r>
+          </a:p>
+          <a:p>
+            <a:pPr marL="1371600" lvl="2" indent="-457200">
+              <a:buFont typeface="Arial"/>
+              <a:buChar char="•"/>
+            </a:pPr>
+            <a:r>
+              <a:rPr lang="en-US" sz="2000" dirty="0">
+                <a:solidFill>
+                  <a:schemeClr val="bg1"/>
+                </a:solidFill>
+                <a:latin typeface="Times New Roman" pitchFamily="18" charset="0"/>
+                <a:cs typeface="Times New Roman" pitchFamily="18" charset="0"/>
+              </a:rPr>
+              <a:t>Snowfall  </a:t>
+            </a:r>
+          </a:p>
+          <a:p>
+            <a:pPr marL="1371600" lvl="2" indent="-457200">
+              <a:buFont typeface="Arial"/>
+              <a:buChar char="•"/>
+            </a:pPr>
+            <a:r>
+              <a:rPr lang="en-US" sz="2000" dirty="0">
+                <a:solidFill>
+                  <a:schemeClr val="bg1"/>
+                </a:solidFill>
+                <a:latin typeface="Times New Roman" pitchFamily="18" charset="0"/>
+                <a:cs typeface="Times New Roman" pitchFamily="18" charset="0"/>
+              </a:rPr>
+              <a:t>Snow </a:t>
+            </a:r>
+            <a:r>
+              <a:rPr lang="en-US" sz="2000" dirty="0" smtClean="0">
+                <a:solidFill>
+                  <a:schemeClr val="bg1"/>
+                </a:solidFill>
+                <a:latin typeface="Times New Roman" pitchFamily="18" charset="0"/>
+                <a:cs typeface="Times New Roman" pitchFamily="18" charset="0"/>
+              </a:rPr>
+              <a:t>Depth</a:t>
+            </a:r>
+            <a:endParaRPr lang="en-US" sz="2800" dirty="0" smtClean="0">
+              <a:solidFill>
+                <a:schemeClr val="bg1"/>
+              </a:solidFill>
+              <a:latin typeface="Times New Roman" pitchFamily="18" charset="0"/>
+              <a:cs typeface="Times New Roman" pitchFamily="18" charset="0"/>
+            </a:endParaRPr>
+          </a:p>
+          <a:p>
+            <a:pPr marL="914400" lvl="1" indent="-457200">
+              <a:buFont typeface="Arial"/>
+              <a:buChar char="•"/>
+            </a:pPr>
+            <a:r>
+              <a:rPr lang="en-US" sz="2800" dirty="0" smtClean="0">
+                <a:solidFill>
+                  <a:schemeClr val="bg1"/>
+                </a:solidFill>
+                <a:latin typeface="Times New Roman" pitchFamily="18" charset="0"/>
+                <a:cs typeface="Times New Roman" pitchFamily="18" charset="0"/>
+              </a:rPr>
+              <a:t>For each observation station, we use mean and variance value of the 5 key elements in 12 months</a:t>
+            </a:r>
+          </a:p>
+          <a:p>
+            <a:pPr marL="1371600" lvl="2" indent="-457200">
+              <a:buFont typeface="Arial"/>
+              <a:buChar char="•"/>
+            </a:pPr>
+            <a:r>
+              <a:rPr lang="en-US" sz="2000" dirty="0" smtClean="0">
+                <a:solidFill>
+                  <a:schemeClr val="bg1"/>
+                </a:solidFill>
+                <a:latin typeface="Times New Roman" pitchFamily="18" charset="0"/>
+                <a:cs typeface="Times New Roman" pitchFamily="18" charset="0"/>
+              </a:rPr>
+              <a:t>120 dimensional</a:t>
+            </a:r>
+          </a:p>
+          <a:p>
+            <a:pPr marL="914400" lvl="1" indent="-457200">
+              <a:buFont typeface="Arial"/>
+              <a:buChar char="•"/>
+            </a:pPr>
+            <a:endParaRPr lang="en-US" sz="2800" dirty="0" smtClean="0">
+              <a:solidFill>
+                <a:schemeClr val="bg1"/>
+              </a:solidFill>
+              <a:latin typeface="Times New Roman" pitchFamily="18" charset="0"/>
+              <a:cs typeface="Times New Roman" pitchFamily="18" charset="0"/>
+            </a:endParaRPr>
+          </a:p>
+          <a:p>
+            <a:pPr marL="1371600" lvl="2" indent="-457200">
+              <a:buFont typeface="Arial"/>
+              <a:buChar char="•"/>
+            </a:pPr>
+            <a:endParaRPr lang="en-US" sz="2000" dirty="0">
+              <a:solidFill>
+                <a:schemeClr val="bg1"/>
+              </a:solidFill>
+              <a:latin typeface="Times New Roman" pitchFamily="18" charset="0"/>
+              <a:cs typeface="Times New Roman" pitchFamily="18" charset="0"/>
+            </a:endParaRPr>
+          </a:p>
+        </p:txBody>
+      </p:sp>
     </p:spTree>
   </p:cSld>
   <p:clrMapOvr>
@@ -3559,6 +3775,324 @@
       </p:grpSpPr>
       <p:sp>
         <p:nvSpPr>
+          <p:cNvPr id="11" name="标题 1"/>
+          <p:cNvSpPr>
+            <a:spLocks noGrp="1"/>
+          </p:cNvSpPr>
+          <p:nvPr>
+            <p:ph type="title"/>
+          </p:nvPr>
+        </p:nvSpPr>
+        <p:spPr>
+          <a:xfrm>
+            <a:off x="457200" y="274638"/>
+            <a:ext cx="5757874" cy="654032"/>
+          </a:xfrm>
+        </p:spPr>
+        <p:txBody>
+          <a:bodyPr>
+            <a:noAutofit/>
+          </a:bodyPr>
+          <a:lstStyle/>
+          <a:p>
+            <a:pPr algn="l"/>
+            <a:r>
+              <a:rPr lang="en-US" altLang="zh-CN" sz="4000" b="1" dirty="0" smtClean="0">
+                <a:solidFill>
+                  <a:schemeClr val="bg1"/>
+                </a:solidFill>
+                <a:latin typeface="Times New Roman" pitchFamily="18" charset="0"/>
+                <a:cs typeface="Times New Roman" pitchFamily="18" charset="0"/>
+              </a:rPr>
+              <a:t>Design</a:t>
+            </a:r>
+            <a:endParaRPr lang="zh-CN" altLang="en-US" sz="4000" b="1" dirty="0">
+              <a:solidFill>
+                <a:schemeClr val="bg1"/>
+              </a:solidFill>
+              <a:latin typeface="Times New Roman" pitchFamily="18" charset="0"/>
+              <a:cs typeface="Times New Roman" pitchFamily="18" charset="0"/>
+            </a:endParaRPr>
+          </a:p>
+        </p:txBody>
+      </p:sp>
+      <p:sp>
+        <p:nvSpPr>
+          <p:cNvPr id="4" name="Rectangle 3"/>
+          <p:cNvSpPr/>
+          <p:nvPr/>
+        </p:nvSpPr>
+        <p:spPr>
+          <a:xfrm>
+            <a:off x="395536" y="1124744"/>
+            <a:ext cx="7776864" cy="5570756"/>
+          </a:xfrm>
+          <a:prstGeom prst="rect">
+            <a:avLst/>
+          </a:prstGeom>
+        </p:spPr>
+        <p:txBody>
+          <a:bodyPr wrap="square">
+            <a:spAutoFit/>
+          </a:bodyPr>
+          <a:lstStyle/>
+          <a:p>
+            <a:pPr marL="457200" indent="-457200">
+              <a:buFont typeface="Arial"/>
+              <a:buChar char="•"/>
+            </a:pPr>
+            <a:r>
+              <a:rPr lang="en-US" sz="2800" dirty="0" smtClean="0">
+                <a:solidFill>
+                  <a:schemeClr val="bg1"/>
+                </a:solidFill>
+                <a:latin typeface="Times New Roman" pitchFamily="18" charset="0"/>
+                <a:cs typeface="Times New Roman" pitchFamily="18" charset="0"/>
+              </a:rPr>
+              <a:t>Clustering</a:t>
+            </a:r>
+          </a:p>
+          <a:p>
+            <a:pPr lvl="2" indent="-457200">
+              <a:buFont typeface="Arial"/>
+              <a:buChar char="•"/>
+            </a:pPr>
+            <a:r>
+              <a:rPr lang="en-US" sz="2800" dirty="0">
+                <a:solidFill>
+                  <a:schemeClr val="bg1"/>
+                </a:solidFill>
+                <a:latin typeface="Times New Roman" pitchFamily="18" charset="0"/>
+                <a:cs typeface="Times New Roman" pitchFamily="18" charset="0"/>
+              </a:rPr>
+              <a:t>K-means method</a:t>
+            </a:r>
+          </a:p>
+          <a:p>
+            <a:pPr marL="914400" lvl="1" indent="-457200">
+              <a:buFont typeface="Arial"/>
+              <a:buChar char="•"/>
+            </a:pPr>
+            <a:r>
+              <a:rPr lang="en-US" sz="2800" dirty="0">
+                <a:solidFill>
+                  <a:schemeClr val="bg1"/>
+                </a:solidFill>
+                <a:latin typeface="Times New Roman" pitchFamily="18" charset="0"/>
+                <a:cs typeface="Times New Roman" pitchFamily="18" charset="0"/>
+              </a:rPr>
+              <a:t>D</a:t>
+            </a:r>
+            <a:r>
+              <a:rPr lang="en-US" sz="2800" dirty="0" smtClean="0">
+                <a:solidFill>
+                  <a:schemeClr val="bg1"/>
+                </a:solidFill>
+                <a:latin typeface="Times New Roman" pitchFamily="18" charset="0"/>
+                <a:cs typeface="Times New Roman" pitchFamily="18" charset="0"/>
+              </a:rPr>
+              <a:t>ifferent parameters</a:t>
+            </a:r>
+          </a:p>
+          <a:p>
+            <a:pPr marL="1371600" lvl="2" indent="-457200">
+              <a:buFont typeface="Arial"/>
+              <a:buChar char="•"/>
+            </a:pPr>
+            <a:r>
+              <a:rPr lang="en-US" sz="2800" dirty="0" smtClean="0">
+                <a:solidFill>
+                  <a:schemeClr val="bg1"/>
+                </a:solidFill>
+                <a:latin typeface="Times New Roman" pitchFamily="18" charset="0"/>
+                <a:cs typeface="Times New Roman" pitchFamily="18" charset="0"/>
+              </a:rPr>
+              <a:t>cluster numbers</a:t>
+            </a:r>
+          </a:p>
+          <a:p>
+            <a:pPr marL="1371600" lvl="2" indent="-457200">
+              <a:buFont typeface="Arial"/>
+              <a:buChar char="•"/>
+            </a:pPr>
+            <a:r>
+              <a:rPr lang="en-US" sz="2800" dirty="0" smtClean="0">
+                <a:solidFill>
+                  <a:schemeClr val="bg1"/>
+                </a:solidFill>
+                <a:latin typeface="Times New Roman" pitchFamily="18" charset="0"/>
+                <a:cs typeface="Times New Roman" pitchFamily="18" charset="0"/>
+              </a:rPr>
+              <a:t>PCA for reducing dimensions </a:t>
+            </a:r>
+            <a:r>
+              <a:rPr lang="en-US" sz="2800" smtClean="0">
+                <a:solidFill>
+                  <a:schemeClr val="bg1"/>
+                </a:solidFill>
+                <a:latin typeface="Times New Roman" pitchFamily="18" charset="0"/>
+                <a:cs typeface="Times New Roman" pitchFamily="18" charset="0"/>
+              </a:rPr>
+              <a:t>of  features</a:t>
+            </a:r>
+            <a:endParaRPr lang="en-US" sz="2800" dirty="0" smtClean="0">
+              <a:solidFill>
+                <a:schemeClr val="bg1"/>
+              </a:solidFill>
+              <a:latin typeface="Times New Roman" pitchFamily="18" charset="0"/>
+              <a:cs typeface="Times New Roman" pitchFamily="18" charset="0"/>
+            </a:endParaRPr>
+          </a:p>
+          <a:p>
+            <a:pPr marL="1371600" lvl="2" indent="-457200">
+              <a:buFont typeface="Arial"/>
+              <a:buChar char="•"/>
+            </a:pPr>
+            <a:r>
+              <a:rPr lang="en-US" sz="2800" dirty="0" smtClean="0">
+                <a:solidFill>
+                  <a:schemeClr val="bg1"/>
+                </a:solidFill>
+                <a:latin typeface="Times New Roman" pitchFamily="18" charset="0"/>
+                <a:cs typeface="Times New Roman" pitchFamily="18" charset="0"/>
+              </a:rPr>
+              <a:t>Use only mean value for the features</a:t>
+            </a:r>
+          </a:p>
+          <a:p>
+            <a:pPr marL="457200" indent="-457200">
+              <a:buFont typeface="Arial"/>
+              <a:buChar char="•"/>
+            </a:pPr>
+            <a:r>
+              <a:rPr lang="en-US" sz="2800" dirty="0" smtClean="0">
+                <a:solidFill>
+                  <a:schemeClr val="bg1"/>
+                </a:solidFill>
+                <a:latin typeface="Times New Roman" pitchFamily="18" charset="0"/>
+                <a:cs typeface="Times New Roman" pitchFamily="18" charset="0"/>
+              </a:rPr>
+              <a:t>Visualization</a:t>
+            </a:r>
+          </a:p>
+          <a:p>
+            <a:pPr marL="914400" lvl="1" indent="-457200">
+              <a:buFont typeface="Arial"/>
+              <a:buChar char="•"/>
+            </a:pPr>
+            <a:r>
+              <a:rPr lang="en-US" sz="2800" dirty="0" smtClean="0">
+                <a:solidFill>
+                  <a:schemeClr val="bg1"/>
+                </a:solidFill>
+                <a:latin typeface="Times New Roman" pitchFamily="18" charset="0"/>
+                <a:cs typeface="Times New Roman" pitchFamily="18" charset="0"/>
+              </a:rPr>
+              <a:t>Use Google Map API</a:t>
+            </a:r>
+          </a:p>
+          <a:p>
+            <a:pPr marL="914400" lvl="1" indent="-457200">
+              <a:buFont typeface="Arial"/>
+              <a:buChar char="•"/>
+            </a:pPr>
+            <a:r>
+              <a:rPr lang="en-US" sz="2800" dirty="0" smtClean="0">
+                <a:solidFill>
+                  <a:schemeClr val="bg1"/>
+                </a:solidFill>
+                <a:latin typeface="Times New Roman" pitchFamily="18" charset="0"/>
+                <a:cs typeface="Times New Roman" pitchFamily="18" charset="0"/>
+              </a:rPr>
+              <a:t>Visualize the clusters on a World Map</a:t>
+            </a:r>
+          </a:p>
+          <a:p>
+            <a:pPr marL="914400" lvl="1" indent="-457200">
+              <a:buFont typeface="Arial"/>
+              <a:buChar char="•"/>
+            </a:pPr>
+            <a:endParaRPr lang="en-US" sz="2800" dirty="0" smtClean="0">
+              <a:solidFill>
+                <a:schemeClr val="bg1"/>
+              </a:solidFill>
+              <a:latin typeface="Times New Roman" pitchFamily="18" charset="0"/>
+              <a:cs typeface="Times New Roman" pitchFamily="18" charset="0"/>
+            </a:endParaRPr>
+          </a:p>
+          <a:p>
+            <a:pPr marL="914400" lvl="1" indent="-457200">
+              <a:buFont typeface="Arial"/>
+              <a:buChar char="•"/>
+            </a:pPr>
+            <a:endParaRPr lang="en-US" sz="2800" dirty="0" smtClean="0">
+              <a:solidFill>
+                <a:schemeClr val="bg1"/>
+              </a:solidFill>
+              <a:latin typeface="Times New Roman" pitchFamily="18" charset="0"/>
+              <a:cs typeface="Times New Roman" pitchFamily="18" charset="0"/>
+            </a:endParaRPr>
+          </a:p>
+          <a:p>
+            <a:pPr marL="914400" lvl="1" indent="-457200">
+              <a:buFont typeface="Arial"/>
+              <a:buChar char="•"/>
+            </a:pPr>
+            <a:endParaRPr lang="en-US" sz="2800" dirty="0" smtClean="0">
+              <a:solidFill>
+                <a:schemeClr val="bg1"/>
+              </a:solidFill>
+              <a:latin typeface="Times New Roman" pitchFamily="18" charset="0"/>
+              <a:cs typeface="Times New Roman" pitchFamily="18" charset="0"/>
+            </a:endParaRPr>
+          </a:p>
+          <a:p>
+            <a:pPr marL="1371600" lvl="2" indent="-457200">
+              <a:buFont typeface="Arial"/>
+              <a:buChar char="•"/>
+            </a:pPr>
+            <a:endParaRPr lang="en-US" sz="2000" dirty="0">
+              <a:solidFill>
+                <a:schemeClr val="bg1"/>
+              </a:solidFill>
+              <a:latin typeface="Times New Roman" pitchFamily="18" charset="0"/>
+              <a:cs typeface="Times New Roman" pitchFamily="18" charset="0"/>
+            </a:endParaRPr>
+          </a:p>
+        </p:txBody>
+      </p:sp>
+    </p:spTree>
+    <p:extLst>
+      <p:ext uri="{BB962C8B-B14F-4D97-AF65-F5344CB8AC3E}">
+        <p14:creationId xmlns:p14="http://schemas.microsoft.com/office/powerpoint/2010/main" val="3503276465"/>
+      </p:ext>
+    </p:extLst>
+  </p:cSld>
+  <p:clrMapOvr>
+    <a:masterClrMapping/>
+  </p:clrMapOvr>
+</p:sld>
+</file>
+
+<file path=ppt/slides/slide6.xml><?xml version="1.0" encoding="utf-8"?>
+<p:sld xmlns:a="http://schemas.openxmlformats.org/drawingml/2006/main" xmlns:r="http://schemas.openxmlformats.org/officeDocument/2006/relationships" xmlns:p="http://schemas.openxmlformats.org/presentationml/2006/main">
+  <p:cSld>
+    <p:spTree>
+      <p:nvGrpSpPr>
+        <p:cNvPr id="1" name=""/>
+        <p:cNvGrpSpPr/>
+        <p:nvPr/>
+      </p:nvGrpSpPr>
+      <p:grpSpPr>
+        <a:xfrm>
+          <a:off x="0" y="0"/>
+          <a:ext cx="0" cy="0"/>
+          <a:chOff x="0" y="0"/>
+          <a:chExt cx="0" cy="0"/>
+        </a:xfrm>
+      </p:grpSpPr>
+      <p:sp>
+        <p:nvSpPr>
           <p:cNvPr id="2" name="标题 1"/>
           <p:cNvSpPr>
             <a:spLocks noGrp="1"/>
@@ -3660,27 +4194,7 @@
                 <a:latin typeface="Times New Roman" pitchFamily="18" charset="0"/>
                 <a:cs typeface="Times New Roman" pitchFamily="18" charset="0"/>
               </a:rPr>
-              <a:t>Well-known Climate </a:t>
-            </a:r>
-            <a:r>
-              <a:rPr lang="en-US" sz="2000" dirty="0" smtClean="0">
-                <a:solidFill>
-                  <a:schemeClr val="bg1"/>
-                </a:solidFill>
-                <a:latin typeface="Times New Roman" pitchFamily="18" charset="0"/>
-                <a:cs typeface="Times New Roman" pitchFamily="18" charset="0"/>
-              </a:rPr>
-              <a:t>C</a:t>
-            </a:r>
-            <a:r>
-              <a:rPr lang="en-US" sz="2000" dirty="0" smtClean="0">
-                <a:solidFill>
-                  <a:schemeClr val="bg1"/>
-                </a:solidFill>
-                <a:latin typeface="Times New Roman" pitchFamily="18" charset="0"/>
-                <a:cs typeface="Times New Roman" pitchFamily="18" charset="0"/>
-              </a:rPr>
-              <a:t>haracteristics</a:t>
+              <a:t>Well-known Climate Characteristics</a:t>
             </a:r>
           </a:p>
           <a:p>
@@ -3812,7 +4326,7 @@
 </p:sld>
 </file>
 
-<file path=ppt/slides/slide6.xml><?xml version="1.0" encoding="utf-8"?>
+<file path=ppt/slides/slide7.xml><?xml version="1.0" encoding="utf-8"?>
 <p:sld xmlns:a="http://schemas.openxmlformats.org/drawingml/2006/main" xmlns:r="http://schemas.openxmlformats.org/officeDocument/2006/relationships" xmlns:p="http://schemas.openxmlformats.org/presentationml/2006/main">
   <p:cSld>
     <p:spTree>
@@ -4154,7 +4668,7 @@
 </p:sld>
 </file>
 
-<file path=ppt/slides/slide7.xml><?xml version="1.0" encoding="utf-8"?>
+<file path=ppt/slides/slide8.xml><?xml version="1.0" encoding="utf-8"?>
 <p:sld xmlns:a="http://schemas.openxmlformats.org/drawingml/2006/main" xmlns:r="http://schemas.openxmlformats.org/officeDocument/2006/relationships" xmlns:p="http://schemas.openxmlformats.org/presentationml/2006/main">
   <p:cSld>
     <p:spTree>

</xml_diff>